<commit_message>
Replace tag with mod
</commit_message>
<xml_diff>
--- a/docs/diagrams/ModelComponentClassDiagram.pptx
+++ b/docs/diagrams/ModelComponentClassDiagram.pptx
@@ -4437,7 +4437,7 @@
                   <a:srgbClr val="7030A0"/>
                 </a:solidFill>
               </a:rPr>
-              <a:t>UniqueTagList</a:t>
+              <a:t>UniqueModList</a:t>
             </a:r>
             <a:endParaRPr lang="en-SG" sz="1050" dirty="0">
               <a:solidFill>
@@ -4675,7 +4675,7 @@
                   <a:srgbClr val="7030A0"/>
                 </a:solidFill>
               </a:rPr>
-              <a:t>Tag</a:t>
+              <a:t>Mod</a:t>
             </a:r>
             <a:endParaRPr lang="en-SG" sz="1050" dirty="0">
               <a:solidFill>

</xml_diff>